<commit_message>
Changes for Basta 2018-09
</commit_message>
<xml_diff>
--- a/slides.pptx
+++ b/slides.pptx
@@ -24,7 +24,7 @@
     <p:sldId id="323" r:id="rId15"/>
     <p:sldId id="324" r:id="rId16"/>
     <p:sldId id="326" r:id="rId17"/>
-    <p:sldId id="325" r:id="rId18"/>
+    <p:sldId id="327" r:id="rId18"/>
   </p:sldIdLst>
   <p:sldSz cx="12192000" cy="6858000"/>
   <p:notesSz cx="6858000" cy="9144000"/>
@@ -7606,7 +7606,7 @@
         <p:spPr>
           <a:xfrm>
             <a:off x="733529" y="5206719"/>
-            <a:ext cx="3904915" cy="707886"/>
+            <a:ext cx="7038722" cy="1123384"/>
           </a:xfrm>
           <a:prstGeom prst="rect">
             <a:avLst/>
@@ -7628,6 +7628,23 @@
             <a:r>
               <a:rPr lang="de-DE" sz="2000" dirty="0"/>
               <a:t>MVP Windows Development</a:t>
+            </a:r>
+          </a:p>
+          <a:p>
+            <a:endParaRPr lang="de-DE" sz="700" dirty="0"/>
+          </a:p>
+          <a:p>
+            <a:r>
+              <a:rPr lang="de-DE" sz="2000" dirty="0"/>
+              <a:t>@</a:t>
+            </a:r>
+            <a:r>
+              <a:rPr lang="de-DE" sz="2000" dirty="0" err="1"/>
+              <a:t>rschacherl</a:t>
+            </a:r>
+            <a:r>
+              <a:rPr lang="de-DE" sz="2000" dirty="0"/>
+              <a:t> | roman.schacherl@softaware.at | www.softaware.at</a:t>
             </a:r>
             <a:endParaRPr lang="de-AT" sz="2000" dirty="0"/>
           </a:p>
@@ -7951,7 +7968,7 @@
           <a:p>
             <a:r>
               <a:rPr lang="de-AT" dirty="0"/>
-              <a:t>Integration ins Azure Portal, Visual Studio, etc.</a:t>
+              <a:t>Integration ins Azure Portal und Visual Studio</a:t>
             </a:r>
           </a:p>
           <a:p>
@@ -9343,7 +9360,7 @@
               <p14:nvPr/>
             </p14:nvContentPartPr>
             <p14:xfrm>
-              <a:off x="8056840" y="1894600"/>
+              <a:off x="8006833" y="1894600"/>
               <a:ext cx="5400" cy="147960"/>
             </p14:xfrm>
           </p:contentPart>
@@ -9363,7 +9380,7 @@
             </p:blipFill>
             <p:spPr>
               <a:xfrm>
-                <a:off x="8047480" y="1885240"/>
+                <a:off x="7997473" y="1885240"/>
                 <a:ext cx="24120" cy="166680"/>
               </a:xfrm>
               <a:prstGeom prst="rect">
@@ -14687,6 +14704,289 @@
       </p:transition>
     </mc:Fallback>
   </mc:AlternateContent>
+  <p:timing>
+    <p:tnLst>
+      <p:par>
+        <p:cTn id="1" dur="indefinite" restart="never" nodeType="tmRoot">
+          <p:childTnLst>
+            <p:seq concurrent="1" nextAc="seek">
+              <p:cTn id="2" dur="indefinite" nodeType="mainSeq">
+                <p:childTnLst>
+                  <p:par>
+                    <p:cTn id="3" fill="hold">
+                      <p:stCondLst>
+                        <p:cond delay="indefinite"/>
+                        <p:cond evt="onBegin" delay="0">
+                          <p:tn val="2"/>
+                        </p:cond>
+                      </p:stCondLst>
+                      <p:childTnLst>
+                        <p:par>
+                          <p:cTn id="4" fill="hold">
+                            <p:stCondLst>
+                              <p:cond delay="0"/>
+                            </p:stCondLst>
+                            <p:childTnLst>
+                              <p:par>
+                                <p:cTn id="5" presetID="10" presetClass="entr" presetSubtype="0" fill="hold" nodeType="afterEffect">
+                                  <p:stCondLst>
+                                    <p:cond delay="0"/>
+                                  </p:stCondLst>
+                                  <p:childTnLst>
+                                    <p:set>
+                                      <p:cBhvr>
+                                        <p:cTn id="6" dur="1" fill="hold">
+                                          <p:stCondLst>
+                                            <p:cond delay="0"/>
+                                          </p:stCondLst>
+                                        </p:cTn>
+                                        <p:tgtEl>
+                                          <p:spTgt spid="2"/>
+                                        </p:tgtEl>
+                                        <p:attrNameLst>
+                                          <p:attrName>style.visibility</p:attrName>
+                                        </p:attrNameLst>
+                                      </p:cBhvr>
+                                      <p:to>
+                                        <p:strVal val="visible"/>
+                                      </p:to>
+                                    </p:set>
+                                    <p:animEffect transition="in" filter="fade">
+                                      <p:cBhvr>
+                                        <p:cTn id="7" dur="500"/>
+                                        <p:tgtEl>
+                                          <p:spTgt spid="2"/>
+                                        </p:tgtEl>
+                                      </p:cBhvr>
+                                    </p:animEffect>
+                                  </p:childTnLst>
+                                </p:cTn>
+                              </p:par>
+                            </p:childTnLst>
+                          </p:cTn>
+                        </p:par>
+                      </p:childTnLst>
+                    </p:cTn>
+                  </p:par>
+                  <p:par>
+                    <p:cTn id="8" fill="hold">
+                      <p:stCondLst>
+                        <p:cond delay="indefinite"/>
+                      </p:stCondLst>
+                      <p:childTnLst>
+                        <p:par>
+                          <p:cTn id="9" fill="hold">
+                            <p:stCondLst>
+                              <p:cond delay="0"/>
+                            </p:stCondLst>
+                            <p:childTnLst>
+                              <p:par>
+                                <p:cTn id="10" presetID="10" presetClass="entr" presetSubtype="0" fill="hold" nodeType="clickEffect">
+                                  <p:stCondLst>
+                                    <p:cond delay="0"/>
+                                  </p:stCondLst>
+                                  <p:childTnLst>
+                                    <p:set>
+                                      <p:cBhvr>
+                                        <p:cTn id="11" dur="1" fill="hold">
+                                          <p:stCondLst>
+                                            <p:cond delay="0"/>
+                                          </p:stCondLst>
+                                        </p:cTn>
+                                        <p:tgtEl>
+                                          <p:spTgt spid="3"/>
+                                        </p:tgtEl>
+                                        <p:attrNameLst>
+                                          <p:attrName>style.visibility</p:attrName>
+                                        </p:attrNameLst>
+                                      </p:cBhvr>
+                                      <p:to>
+                                        <p:strVal val="visible"/>
+                                      </p:to>
+                                    </p:set>
+                                    <p:animEffect transition="in" filter="fade">
+                                      <p:cBhvr>
+                                        <p:cTn id="12" dur="500"/>
+                                        <p:tgtEl>
+                                          <p:spTgt spid="3"/>
+                                        </p:tgtEl>
+                                      </p:cBhvr>
+                                    </p:animEffect>
+                                  </p:childTnLst>
+                                </p:cTn>
+                              </p:par>
+                            </p:childTnLst>
+                          </p:cTn>
+                        </p:par>
+                      </p:childTnLst>
+                    </p:cTn>
+                  </p:par>
+                  <p:par>
+                    <p:cTn id="13" fill="hold">
+                      <p:stCondLst>
+                        <p:cond delay="indefinite"/>
+                      </p:stCondLst>
+                      <p:childTnLst>
+                        <p:par>
+                          <p:cTn id="14" fill="hold">
+                            <p:stCondLst>
+                              <p:cond delay="0"/>
+                            </p:stCondLst>
+                            <p:childTnLst>
+                              <p:par>
+                                <p:cTn id="15" presetID="10" presetClass="entr" presetSubtype="0" fill="hold" nodeType="clickEffect">
+                                  <p:stCondLst>
+                                    <p:cond delay="0"/>
+                                  </p:stCondLst>
+                                  <p:childTnLst>
+                                    <p:set>
+                                      <p:cBhvr>
+                                        <p:cTn id="16" dur="1" fill="hold">
+                                          <p:stCondLst>
+                                            <p:cond delay="0"/>
+                                          </p:stCondLst>
+                                        </p:cTn>
+                                        <p:tgtEl>
+                                          <p:spTgt spid="4"/>
+                                        </p:tgtEl>
+                                        <p:attrNameLst>
+                                          <p:attrName>style.visibility</p:attrName>
+                                        </p:attrNameLst>
+                                      </p:cBhvr>
+                                      <p:to>
+                                        <p:strVal val="visible"/>
+                                      </p:to>
+                                    </p:set>
+                                    <p:animEffect transition="in" filter="fade">
+                                      <p:cBhvr>
+                                        <p:cTn id="17" dur="500"/>
+                                        <p:tgtEl>
+                                          <p:spTgt spid="4"/>
+                                        </p:tgtEl>
+                                      </p:cBhvr>
+                                    </p:animEffect>
+                                  </p:childTnLst>
+                                </p:cTn>
+                              </p:par>
+                            </p:childTnLst>
+                          </p:cTn>
+                        </p:par>
+                      </p:childTnLst>
+                    </p:cTn>
+                  </p:par>
+                  <p:par>
+                    <p:cTn id="18" fill="hold">
+                      <p:stCondLst>
+                        <p:cond delay="indefinite"/>
+                      </p:stCondLst>
+                      <p:childTnLst>
+                        <p:par>
+                          <p:cTn id="19" fill="hold">
+                            <p:stCondLst>
+                              <p:cond delay="0"/>
+                            </p:stCondLst>
+                            <p:childTnLst>
+                              <p:par>
+                                <p:cTn id="20" presetID="10" presetClass="entr" presetSubtype="0" fill="hold" grpId="0" nodeType="clickEffect">
+                                  <p:stCondLst>
+                                    <p:cond delay="0"/>
+                                  </p:stCondLst>
+                                  <p:childTnLst>
+                                    <p:set>
+                                      <p:cBhvr>
+                                        <p:cTn id="21" dur="1" fill="hold">
+                                          <p:stCondLst>
+                                            <p:cond delay="0"/>
+                                          </p:stCondLst>
+                                        </p:cTn>
+                                        <p:tgtEl>
+                                          <p:spTgt spid="7"/>
+                                        </p:tgtEl>
+                                        <p:attrNameLst>
+                                          <p:attrName>style.visibility</p:attrName>
+                                        </p:attrNameLst>
+                                      </p:cBhvr>
+                                      <p:to>
+                                        <p:strVal val="visible"/>
+                                      </p:to>
+                                    </p:set>
+                                    <p:animEffect transition="in" filter="fade">
+                                      <p:cBhvr>
+                                        <p:cTn id="22" dur="500"/>
+                                        <p:tgtEl>
+                                          <p:spTgt spid="7"/>
+                                        </p:tgtEl>
+                                      </p:cBhvr>
+                                    </p:animEffect>
+                                  </p:childTnLst>
+                                </p:cTn>
+                              </p:par>
+                              <p:par>
+                                <p:cTn id="23" presetID="10" presetClass="entr" presetSubtype="0" fill="hold" nodeType="withEffect">
+                                  <p:stCondLst>
+                                    <p:cond delay="0"/>
+                                  </p:stCondLst>
+                                  <p:childTnLst>
+                                    <p:set>
+                                      <p:cBhvr>
+                                        <p:cTn id="24" dur="1" fill="hold">
+                                          <p:stCondLst>
+                                            <p:cond delay="0"/>
+                                          </p:stCondLst>
+                                        </p:cTn>
+                                        <p:tgtEl>
+                                          <p:spTgt spid="6"/>
+                                        </p:tgtEl>
+                                        <p:attrNameLst>
+                                          <p:attrName>style.visibility</p:attrName>
+                                        </p:attrNameLst>
+                                      </p:cBhvr>
+                                      <p:to>
+                                        <p:strVal val="visible"/>
+                                      </p:to>
+                                    </p:set>
+                                    <p:animEffect transition="in" filter="fade">
+                                      <p:cBhvr>
+                                        <p:cTn id="25" dur="500"/>
+                                        <p:tgtEl>
+                                          <p:spTgt spid="6"/>
+                                        </p:tgtEl>
+                                      </p:cBhvr>
+                                    </p:animEffect>
+                                  </p:childTnLst>
+                                </p:cTn>
+                              </p:par>
+                            </p:childTnLst>
+                          </p:cTn>
+                        </p:par>
+                      </p:childTnLst>
+                    </p:cTn>
+                  </p:par>
+                </p:childTnLst>
+              </p:cTn>
+              <p:prevCondLst>
+                <p:cond evt="onPrev" delay="0">
+                  <p:tgtEl>
+                    <p:sldTgt/>
+                  </p:tgtEl>
+                </p:cond>
+              </p:prevCondLst>
+              <p:nextCondLst>
+                <p:cond evt="onNext" delay="0">
+                  <p:tgtEl>
+                    <p:sldTgt/>
+                  </p:tgtEl>
+                </p:cond>
+              </p:nextCondLst>
+            </p:seq>
+          </p:childTnLst>
+        </p:cTn>
+      </p:par>
+    </p:tnLst>
+    <p:bldLst>
+      <p:bldP spid="7" grpId="0" animBg="1"/>
+    </p:bldLst>
+  </p:timing>
 </p:sld>
 </file>
 
@@ -14824,6 +15124,351 @@
       </p:transition>
     </mc:Fallback>
   </mc:AlternateContent>
+  <p:timing>
+    <p:tnLst>
+      <p:par>
+        <p:cTn id="1" dur="indefinite" restart="never" nodeType="tmRoot">
+          <p:childTnLst>
+            <p:seq concurrent="1" nextAc="seek">
+              <p:cTn id="2" dur="indefinite" nodeType="mainSeq">
+                <p:childTnLst>
+                  <p:par>
+                    <p:cTn id="3" fill="hold">
+                      <p:stCondLst>
+                        <p:cond delay="indefinite"/>
+                        <p:cond evt="onBegin" delay="0">
+                          <p:tn val="2"/>
+                        </p:cond>
+                      </p:stCondLst>
+                      <p:childTnLst>
+                        <p:par>
+                          <p:cTn id="4" fill="hold">
+                            <p:stCondLst>
+                              <p:cond delay="0"/>
+                            </p:stCondLst>
+                            <p:childTnLst>
+                              <p:par>
+                                <p:cTn id="5" presetID="10" presetClass="entr" presetSubtype="0" fill="hold" nodeType="afterEffect">
+                                  <p:stCondLst>
+                                    <p:cond delay="0"/>
+                                  </p:stCondLst>
+                                  <p:childTnLst>
+                                    <p:set>
+                                      <p:cBhvr>
+                                        <p:cTn id="6" dur="1" fill="hold">
+                                          <p:stCondLst>
+                                            <p:cond delay="0"/>
+                                          </p:stCondLst>
+                                        </p:cTn>
+                                        <p:tgtEl>
+                                          <p:spTgt spid="3">
+                                            <p:txEl>
+                                              <p:pRg st="0" end="0"/>
+                                            </p:txEl>
+                                          </p:spTgt>
+                                        </p:tgtEl>
+                                        <p:attrNameLst>
+                                          <p:attrName>style.visibility</p:attrName>
+                                        </p:attrNameLst>
+                                      </p:cBhvr>
+                                      <p:to>
+                                        <p:strVal val="visible"/>
+                                      </p:to>
+                                    </p:set>
+                                    <p:animEffect transition="in" filter="fade">
+                                      <p:cBhvr>
+                                        <p:cTn id="7" dur="500"/>
+                                        <p:tgtEl>
+                                          <p:spTgt spid="3">
+                                            <p:txEl>
+                                              <p:pRg st="0" end="0"/>
+                                            </p:txEl>
+                                          </p:spTgt>
+                                        </p:tgtEl>
+                                      </p:cBhvr>
+                                    </p:animEffect>
+                                  </p:childTnLst>
+                                </p:cTn>
+                              </p:par>
+                            </p:childTnLst>
+                          </p:cTn>
+                        </p:par>
+                      </p:childTnLst>
+                    </p:cTn>
+                  </p:par>
+                  <p:par>
+                    <p:cTn id="8" fill="hold">
+                      <p:stCondLst>
+                        <p:cond delay="indefinite"/>
+                      </p:stCondLst>
+                      <p:childTnLst>
+                        <p:par>
+                          <p:cTn id="9" fill="hold">
+                            <p:stCondLst>
+                              <p:cond delay="0"/>
+                            </p:stCondLst>
+                            <p:childTnLst>
+                              <p:par>
+                                <p:cTn id="10" presetID="10" presetClass="entr" presetSubtype="0" fill="hold" nodeType="clickEffect">
+                                  <p:stCondLst>
+                                    <p:cond delay="0"/>
+                                  </p:stCondLst>
+                                  <p:childTnLst>
+                                    <p:set>
+                                      <p:cBhvr>
+                                        <p:cTn id="11" dur="1" fill="hold">
+                                          <p:stCondLst>
+                                            <p:cond delay="0"/>
+                                          </p:stCondLst>
+                                        </p:cTn>
+                                        <p:tgtEl>
+                                          <p:spTgt spid="3">
+                                            <p:txEl>
+                                              <p:pRg st="1" end="1"/>
+                                            </p:txEl>
+                                          </p:spTgt>
+                                        </p:tgtEl>
+                                        <p:attrNameLst>
+                                          <p:attrName>style.visibility</p:attrName>
+                                        </p:attrNameLst>
+                                      </p:cBhvr>
+                                      <p:to>
+                                        <p:strVal val="visible"/>
+                                      </p:to>
+                                    </p:set>
+                                    <p:animEffect transition="in" filter="fade">
+                                      <p:cBhvr>
+                                        <p:cTn id="12" dur="500"/>
+                                        <p:tgtEl>
+                                          <p:spTgt spid="3">
+                                            <p:txEl>
+                                              <p:pRg st="1" end="1"/>
+                                            </p:txEl>
+                                          </p:spTgt>
+                                        </p:tgtEl>
+                                      </p:cBhvr>
+                                    </p:animEffect>
+                                  </p:childTnLst>
+                                </p:cTn>
+                              </p:par>
+                            </p:childTnLst>
+                          </p:cTn>
+                        </p:par>
+                      </p:childTnLst>
+                    </p:cTn>
+                  </p:par>
+                  <p:par>
+                    <p:cTn id="13" fill="hold">
+                      <p:stCondLst>
+                        <p:cond delay="indefinite"/>
+                      </p:stCondLst>
+                      <p:childTnLst>
+                        <p:par>
+                          <p:cTn id="14" fill="hold">
+                            <p:stCondLst>
+                              <p:cond delay="0"/>
+                            </p:stCondLst>
+                            <p:childTnLst>
+                              <p:par>
+                                <p:cTn id="15" presetID="10" presetClass="entr" presetSubtype="0" fill="hold" nodeType="clickEffect">
+                                  <p:stCondLst>
+                                    <p:cond delay="0"/>
+                                  </p:stCondLst>
+                                  <p:childTnLst>
+                                    <p:set>
+                                      <p:cBhvr>
+                                        <p:cTn id="16" dur="1" fill="hold">
+                                          <p:stCondLst>
+                                            <p:cond delay="0"/>
+                                          </p:stCondLst>
+                                        </p:cTn>
+                                        <p:tgtEl>
+                                          <p:spTgt spid="3">
+                                            <p:txEl>
+                                              <p:pRg st="2" end="2"/>
+                                            </p:txEl>
+                                          </p:spTgt>
+                                        </p:tgtEl>
+                                        <p:attrNameLst>
+                                          <p:attrName>style.visibility</p:attrName>
+                                        </p:attrNameLst>
+                                      </p:cBhvr>
+                                      <p:to>
+                                        <p:strVal val="visible"/>
+                                      </p:to>
+                                    </p:set>
+                                    <p:animEffect transition="in" filter="fade">
+                                      <p:cBhvr>
+                                        <p:cTn id="17" dur="500"/>
+                                        <p:tgtEl>
+                                          <p:spTgt spid="3">
+                                            <p:txEl>
+                                              <p:pRg st="2" end="2"/>
+                                            </p:txEl>
+                                          </p:spTgt>
+                                        </p:tgtEl>
+                                      </p:cBhvr>
+                                    </p:animEffect>
+                                  </p:childTnLst>
+                                </p:cTn>
+                              </p:par>
+                              <p:par>
+                                <p:cTn id="18" presetID="10" presetClass="entr" presetSubtype="0" fill="hold" nodeType="withEffect">
+                                  <p:stCondLst>
+                                    <p:cond delay="0"/>
+                                  </p:stCondLst>
+                                  <p:childTnLst>
+                                    <p:set>
+                                      <p:cBhvr>
+                                        <p:cTn id="19" dur="1" fill="hold">
+                                          <p:stCondLst>
+                                            <p:cond delay="0"/>
+                                          </p:stCondLst>
+                                        </p:cTn>
+                                        <p:tgtEl>
+                                          <p:spTgt spid="3">
+                                            <p:txEl>
+                                              <p:pRg st="3" end="3"/>
+                                            </p:txEl>
+                                          </p:spTgt>
+                                        </p:tgtEl>
+                                        <p:attrNameLst>
+                                          <p:attrName>style.visibility</p:attrName>
+                                        </p:attrNameLst>
+                                      </p:cBhvr>
+                                      <p:to>
+                                        <p:strVal val="visible"/>
+                                      </p:to>
+                                    </p:set>
+                                    <p:animEffect transition="in" filter="fade">
+                                      <p:cBhvr>
+                                        <p:cTn id="20" dur="500"/>
+                                        <p:tgtEl>
+                                          <p:spTgt spid="3">
+                                            <p:txEl>
+                                              <p:pRg st="3" end="3"/>
+                                            </p:txEl>
+                                          </p:spTgt>
+                                        </p:tgtEl>
+                                      </p:cBhvr>
+                                    </p:animEffect>
+                                  </p:childTnLst>
+                                </p:cTn>
+                              </p:par>
+                              <p:par>
+                                <p:cTn id="21" presetID="10" presetClass="entr" presetSubtype="0" fill="hold" nodeType="withEffect">
+                                  <p:stCondLst>
+                                    <p:cond delay="0"/>
+                                  </p:stCondLst>
+                                  <p:childTnLst>
+                                    <p:set>
+                                      <p:cBhvr>
+                                        <p:cTn id="22" dur="1" fill="hold">
+                                          <p:stCondLst>
+                                            <p:cond delay="0"/>
+                                          </p:stCondLst>
+                                        </p:cTn>
+                                        <p:tgtEl>
+                                          <p:spTgt spid="3">
+                                            <p:txEl>
+                                              <p:pRg st="4" end="4"/>
+                                            </p:txEl>
+                                          </p:spTgt>
+                                        </p:tgtEl>
+                                        <p:attrNameLst>
+                                          <p:attrName>style.visibility</p:attrName>
+                                        </p:attrNameLst>
+                                      </p:cBhvr>
+                                      <p:to>
+                                        <p:strVal val="visible"/>
+                                      </p:to>
+                                    </p:set>
+                                    <p:animEffect transition="in" filter="fade">
+                                      <p:cBhvr>
+                                        <p:cTn id="23" dur="500"/>
+                                        <p:tgtEl>
+                                          <p:spTgt spid="3">
+                                            <p:txEl>
+                                              <p:pRg st="4" end="4"/>
+                                            </p:txEl>
+                                          </p:spTgt>
+                                        </p:tgtEl>
+                                      </p:cBhvr>
+                                    </p:animEffect>
+                                  </p:childTnLst>
+                                </p:cTn>
+                              </p:par>
+                              <p:par>
+                                <p:cTn id="24" presetID="10" presetClass="entr" presetSubtype="0" fill="hold" nodeType="withEffect">
+                                  <p:stCondLst>
+                                    <p:cond delay="0"/>
+                                  </p:stCondLst>
+                                  <p:childTnLst>
+                                    <p:set>
+                                      <p:cBhvr>
+                                        <p:cTn id="25" dur="1" fill="hold">
+                                          <p:stCondLst>
+                                            <p:cond delay="0"/>
+                                          </p:stCondLst>
+                                        </p:cTn>
+                                        <p:tgtEl>
+                                          <p:spTgt spid="3">
+                                            <p:txEl>
+                                              <p:pRg st="5" end="5"/>
+                                            </p:txEl>
+                                          </p:spTgt>
+                                        </p:tgtEl>
+                                        <p:attrNameLst>
+                                          <p:attrName>style.visibility</p:attrName>
+                                        </p:attrNameLst>
+                                      </p:cBhvr>
+                                      <p:to>
+                                        <p:strVal val="visible"/>
+                                      </p:to>
+                                    </p:set>
+                                    <p:animEffect transition="in" filter="fade">
+                                      <p:cBhvr>
+                                        <p:cTn id="26" dur="500"/>
+                                        <p:tgtEl>
+                                          <p:spTgt spid="3">
+                                            <p:txEl>
+                                              <p:pRg st="5" end="5"/>
+                                            </p:txEl>
+                                          </p:spTgt>
+                                        </p:tgtEl>
+                                      </p:cBhvr>
+                                    </p:animEffect>
+                                  </p:childTnLst>
+                                </p:cTn>
+                              </p:par>
+                            </p:childTnLst>
+                          </p:cTn>
+                        </p:par>
+                      </p:childTnLst>
+                    </p:cTn>
+                  </p:par>
+                </p:childTnLst>
+              </p:cTn>
+              <p:prevCondLst>
+                <p:cond evt="onPrev" delay="0">
+                  <p:tgtEl>
+                    <p:sldTgt/>
+                  </p:tgtEl>
+                </p:cond>
+              </p:prevCondLst>
+              <p:nextCondLst>
+                <p:cond evt="onNext" delay="0">
+                  <p:tgtEl>
+                    <p:sldTgt/>
+                  </p:tgtEl>
+                </p:cond>
+              </p:nextCondLst>
+            </p:seq>
+          </p:childTnLst>
+        </p:cTn>
+      </p:par>
+    </p:tnLst>
+  </p:timing>
 </p:sld>
 </file>
 
@@ -14911,7 +15556,7 @@
         <p:spPr>
           <a:xfrm>
             <a:off x="733529" y="5206719"/>
-            <a:ext cx="3904915" cy="707886"/>
+            <a:ext cx="7038722" cy="1123384"/>
           </a:xfrm>
           <a:prstGeom prst="rect">
             <a:avLst/>
@@ -14933,6 +15578,23 @@
             <a:r>
               <a:rPr lang="de-DE" sz="2000" dirty="0"/>
               <a:t>MVP Windows Development</a:t>
+            </a:r>
+          </a:p>
+          <a:p>
+            <a:endParaRPr lang="de-DE" sz="700" dirty="0"/>
+          </a:p>
+          <a:p>
+            <a:r>
+              <a:rPr lang="de-DE" sz="2000" dirty="0"/>
+              <a:t>@</a:t>
+            </a:r>
+            <a:r>
+              <a:rPr lang="de-DE" sz="2000" dirty="0" err="1"/>
+              <a:t>rschacherl</a:t>
+            </a:r>
+            <a:r>
+              <a:rPr lang="de-DE" sz="2000" dirty="0"/>
+              <a:t> | roman.schacherl@softaware.at | www.softaware.at</a:t>
             </a:r>
             <a:endParaRPr lang="de-AT" sz="2000" dirty="0"/>
           </a:p>
@@ -15028,7 +15690,7 @@
     </p:spTree>
     <p:extLst>
       <p:ext uri="{BB962C8B-B14F-4D97-AF65-F5344CB8AC3E}">
-        <p14:creationId xmlns:p14="http://schemas.microsoft.com/office/powerpoint/2010/main" val="4207503373"/>
+        <p14:creationId xmlns:p14="http://schemas.microsoft.com/office/powerpoint/2010/main" val="2485947843"/>
       </p:ext>
     </p:extLst>
   </p:cSld>
@@ -15069,7 +15731,7 @@
       </p:grpSpPr>
       <p:pic>
         <p:nvPicPr>
-          <p:cNvPr id="3" name="Grafik 2"/>
+          <p:cNvPr id="6" name="Grafik 5"/>
           <p:cNvPicPr>
             <a:picLocks noChangeAspect="1"/>
           </p:cNvPicPr>
@@ -15089,8 +15751,8 @@
         </p:blipFill>
         <p:spPr>
           <a:xfrm>
-            <a:off x="0" y="-1270000"/>
-            <a:ext cx="12192000" cy="8128000"/>
+            <a:off x="0" y="0"/>
+            <a:ext cx="12192000" cy="8115300"/>
           </a:xfrm>
           <a:prstGeom prst="rect">
             <a:avLst/>
@@ -15538,24 +16200,13 @@
           <a:p>
             <a:r>
               <a:rPr lang="de-AT" dirty="0"/>
-              <a:t>Hello, </a:t>
+              <a:t>Real-World-Szenario</a:t>
             </a:r>
-            <a:r>
-              <a:rPr lang="de-AT" dirty="0" err="1"/>
-              <a:t>world</a:t>
-            </a:r>
-            <a:endParaRPr lang="de-AT" dirty="0"/>
           </a:p>
           <a:p>
             <a:r>
               <a:rPr lang="de-AT" dirty="0"/>
               <a:t>Architekturüberlegungen</a:t>
-            </a:r>
-          </a:p>
-          <a:p>
-            <a:r>
-              <a:rPr lang="de-AT" dirty="0"/>
-              <a:t>Real-World-Szenario</a:t>
             </a:r>
           </a:p>
           <a:p>
@@ -15829,67 +16480,6 @@
                                           <p:spTgt spid="3">
                                             <p:txEl>
                                               <p:pRg st="3" end="3"/>
-                                            </p:txEl>
-                                          </p:spTgt>
-                                        </p:tgtEl>
-                                      </p:cBhvr>
-                                    </p:animEffect>
-                                  </p:childTnLst>
-                                </p:cTn>
-                              </p:par>
-                            </p:childTnLst>
-                          </p:cTn>
-                        </p:par>
-                      </p:childTnLst>
-                    </p:cTn>
-                  </p:par>
-                  <p:par>
-                    <p:cTn id="23" fill="hold">
-                      <p:stCondLst>
-                        <p:cond delay="indefinite"/>
-                      </p:stCondLst>
-                      <p:childTnLst>
-                        <p:par>
-                          <p:cTn id="24" fill="hold">
-                            <p:stCondLst>
-                              <p:cond delay="0"/>
-                            </p:stCondLst>
-                            <p:childTnLst>
-                              <p:par>
-                                <p:cTn id="25" presetID="10" presetClass="entr" presetSubtype="0" fill="hold" nodeType="clickEffect">
-                                  <p:stCondLst>
-                                    <p:cond delay="0"/>
-                                  </p:stCondLst>
-                                  <p:childTnLst>
-                                    <p:set>
-                                      <p:cBhvr>
-                                        <p:cTn id="26" dur="1" fill="hold">
-                                          <p:stCondLst>
-                                            <p:cond delay="0"/>
-                                          </p:stCondLst>
-                                        </p:cTn>
-                                        <p:tgtEl>
-                                          <p:spTgt spid="3">
-                                            <p:txEl>
-                                              <p:pRg st="4" end="4"/>
-                                            </p:txEl>
-                                          </p:spTgt>
-                                        </p:tgtEl>
-                                        <p:attrNameLst>
-                                          <p:attrName>style.visibility</p:attrName>
-                                        </p:attrNameLst>
-                                      </p:cBhvr>
-                                      <p:to>
-                                        <p:strVal val="visible"/>
-                                      </p:to>
-                                    </p:set>
-                                    <p:animEffect transition="in" filter="fade">
-                                      <p:cBhvr>
-                                        <p:cTn id="27" dur="500"/>
-                                        <p:tgtEl>
-                                          <p:spTgt spid="3">
-                                            <p:txEl>
-                                              <p:pRg st="4" end="4"/>
                                             </p:txEl>
                                           </p:spTgt>
                                         </p:tgtEl>
@@ -16658,7 +17248,7 @@
 </file>
 
 <file path=ppt/slides/slide9.xml><?xml version="1.0" encoding="utf-8"?>
-<p:sld xmlns:a="http://schemas.openxmlformats.org/drawingml/2006/main" xmlns:r="http://schemas.openxmlformats.org/officeDocument/2006/relationships" xmlns:p="http://schemas.openxmlformats.org/presentationml/2006/main">
+<p:sld xmlns:a="http://schemas.openxmlformats.org/drawingml/2006/main" xmlns:r="http://schemas.openxmlformats.org/officeDocument/2006/relationships" xmlns:p="http://schemas.openxmlformats.org/presentationml/2006/main" show="0">
   <p:cSld>
     <p:spTree>
       <p:nvGrpSpPr>

</xml_diff>